<commit_message>
- updated check command - updated model UML - updated developer guide
</commit_message>
<xml_diff>
--- a/docs/diagrams/ModelComponentClassDiagram.pptx
+++ b/docs/diagrams/ModelComponentClassDiagram.pptx
@@ -208,7 +208,7 @@
           <a:p>
             <a:fld id="{F5CC4B3F-88C1-4FFA-B1B6-F41C21DC6924}" type="datetimeFigureOut">
               <a:rPr lang="en-US" smtClean="0"/>
-              <a:t>10/15/2018</a:t>
+              <a:t>11/9/2018</a:t>
             </a:fld>
             <a:endParaRPr lang="en-US"/>
           </a:p>
@@ -654,7 +654,7 @@
           <a:p>
             <a:fld id="{78C97017-6FC3-485B-9764-EAC9E56C1D49}" type="datetimeFigureOut">
               <a:rPr lang="en-US" smtClean="0"/>
-              <a:t>10/15/2018</a:t>
+              <a:t>11/9/2018</a:t>
             </a:fld>
             <a:endParaRPr lang="en-US"/>
           </a:p>
@@ -822,7 +822,7 @@
           <a:p>
             <a:fld id="{78C97017-6FC3-485B-9764-EAC9E56C1D49}" type="datetimeFigureOut">
               <a:rPr lang="en-US" smtClean="0"/>
-              <a:t>10/15/2018</a:t>
+              <a:t>11/9/2018</a:t>
             </a:fld>
             <a:endParaRPr lang="en-US"/>
           </a:p>
@@ -1000,7 +1000,7 @@
           <a:p>
             <a:fld id="{78C97017-6FC3-485B-9764-EAC9E56C1D49}" type="datetimeFigureOut">
               <a:rPr lang="en-US" smtClean="0"/>
-              <a:t>10/15/2018</a:t>
+              <a:t>11/9/2018</a:t>
             </a:fld>
             <a:endParaRPr lang="en-US"/>
           </a:p>
@@ -1168,7 +1168,7 @@
           <a:p>
             <a:fld id="{78C97017-6FC3-485B-9764-EAC9E56C1D49}" type="datetimeFigureOut">
               <a:rPr lang="en-US" smtClean="0"/>
-              <a:t>10/15/2018</a:t>
+              <a:t>11/9/2018</a:t>
             </a:fld>
             <a:endParaRPr lang="en-US"/>
           </a:p>
@@ -1413,7 +1413,7 @@
           <a:p>
             <a:fld id="{78C97017-6FC3-485B-9764-EAC9E56C1D49}" type="datetimeFigureOut">
               <a:rPr lang="en-US" smtClean="0"/>
-              <a:t>10/15/2018</a:t>
+              <a:t>11/9/2018</a:t>
             </a:fld>
             <a:endParaRPr lang="en-US"/>
           </a:p>
@@ -1698,7 +1698,7 @@
           <a:p>
             <a:fld id="{78C97017-6FC3-485B-9764-EAC9E56C1D49}" type="datetimeFigureOut">
               <a:rPr lang="en-US" smtClean="0"/>
-              <a:t>10/15/2018</a:t>
+              <a:t>11/9/2018</a:t>
             </a:fld>
             <a:endParaRPr lang="en-US"/>
           </a:p>
@@ -2117,7 +2117,7 @@
           <a:p>
             <a:fld id="{78C97017-6FC3-485B-9764-EAC9E56C1D49}" type="datetimeFigureOut">
               <a:rPr lang="en-US" smtClean="0"/>
-              <a:t>10/15/2018</a:t>
+              <a:t>11/9/2018</a:t>
             </a:fld>
             <a:endParaRPr lang="en-US"/>
           </a:p>
@@ -2234,7 +2234,7 @@
           <a:p>
             <a:fld id="{78C97017-6FC3-485B-9764-EAC9E56C1D49}" type="datetimeFigureOut">
               <a:rPr lang="en-US" smtClean="0"/>
-              <a:t>10/15/2018</a:t>
+              <a:t>11/9/2018</a:t>
             </a:fld>
             <a:endParaRPr lang="en-US"/>
           </a:p>
@@ -2329,7 +2329,7 @@
           <a:p>
             <a:fld id="{78C97017-6FC3-485B-9764-EAC9E56C1D49}" type="datetimeFigureOut">
               <a:rPr lang="en-US" smtClean="0"/>
-              <a:t>10/15/2018</a:t>
+              <a:t>11/9/2018</a:t>
             </a:fld>
             <a:endParaRPr lang="en-US"/>
           </a:p>
@@ -2604,7 +2604,7 @@
           <a:p>
             <a:fld id="{78C97017-6FC3-485B-9764-EAC9E56C1D49}" type="datetimeFigureOut">
               <a:rPr lang="en-US" smtClean="0"/>
-              <a:t>10/15/2018</a:t>
+              <a:t>11/9/2018</a:t>
             </a:fld>
             <a:endParaRPr lang="en-US"/>
           </a:p>
@@ -2856,7 +2856,7 @@
           <a:p>
             <a:fld id="{78C97017-6FC3-485B-9764-EAC9E56C1D49}" type="datetimeFigureOut">
               <a:rPr lang="en-US" smtClean="0"/>
-              <a:t>10/15/2018</a:t>
+              <a:t>11/9/2018</a:t>
             </a:fld>
             <a:endParaRPr lang="en-US"/>
           </a:p>
@@ -3067,7 +3067,7 @@
           <a:p>
             <a:fld id="{78C97017-6FC3-485B-9764-EAC9E56C1D49}" type="datetimeFigureOut">
               <a:rPr lang="en-US" smtClean="0"/>
-              <a:t>10/15/2018</a:t>
+              <a:t>11/9/2018</a:t>
             </a:fld>
             <a:endParaRPr lang="en-US"/>
           </a:p>
@@ -3428,6 +3428,16 @@
 <file path=ppt/slides/slide1.xml><?xml version="1.0" encoding="utf-8"?>
 <p:sld xmlns:a="http://schemas.openxmlformats.org/drawingml/2006/main" xmlns:r="http://schemas.openxmlformats.org/officeDocument/2006/relationships" xmlns:p="http://schemas.openxmlformats.org/presentationml/2006/main">
   <p:cSld>
+    <p:bg>
+      <p:bgPr>
+        <a:solidFill>
+          <a:schemeClr val="bg1">
+            <a:alpha val="0"/>
+          </a:schemeClr>
+        </a:solidFill>
+        <a:effectLst/>
+      </p:bgPr>
+    </p:bg>
     <p:spTree>
       <p:nvGrpSpPr>
         <p:cNvPr id="1" name=""/>
@@ -3450,8 +3460,8 @@
         </p:nvSpPr>
         <p:spPr>
           <a:xfrm>
-            <a:off x="1127009" y="1610899"/>
-            <a:ext cx="7559791" cy="3401140"/>
+            <a:off x="366071" y="1225538"/>
+            <a:ext cx="8671336" cy="5486400"/>
           </a:xfrm>
           <a:prstGeom prst="roundRect">
             <a:avLst>
@@ -3488,14 +3498,14 @@
           <a:lstStyle/>
           <a:p>
             <a:r>
-              <a:rPr lang="en-US" sz="1200" b="1" dirty="0">
+              <a:rPr lang="en-US" sz="1100" b="1" dirty="0">
                 <a:solidFill>
                   <a:srgbClr val="7030A0"/>
                 </a:solidFill>
               </a:rPr>
               <a:t>Model</a:t>
             </a:r>
-            <a:endParaRPr lang="en-SG" sz="1200" b="1" dirty="0">
+            <a:endParaRPr lang="en-SG" sz="1100" b="1" dirty="0">
               <a:solidFill>
                 <a:srgbClr val="7030A0"/>
               </a:solidFill>
@@ -3511,7 +3521,7 @@
         </p:nvSpPr>
         <p:spPr>
           <a:xfrm>
-            <a:off x="2877180" y="3463240"/>
+            <a:off x="1982329" y="3158440"/>
             <a:ext cx="1093635" cy="346760"/>
           </a:xfrm>
           <a:prstGeom prst="rect">
@@ -3570,7 +3580,7 @@
         </p:nvSpPr>
         <p:spPr>
           <a:xfrm rot="16200000">
-            <a:off x="1661548" y="3097750"/>
+            <a:off x="766697" y="2792950"/>
             <a:ext cx="1093635" cy="346760"/>
           </a:xfrm>
           <a:prstGeom prst="rect">
@@ -3633,7 +3643,7 @@
         </p:nvCxnSpPr>
         <p:spPr>
           <a:xfrm rot="5400000" flipH="1" flipV="1">
-            <a:off x="4131507" y="1281685"/>
+            <a:off x="3236656" y="976885"/>
             <a:ext cx="613122" cy="4459404"/>
           </a:xfrm>
           <a:prstGeom prst="bentConnector3">
@@ -3674,7 +3684,7 @@
         </p:nvSpPr>
         <p:spPr>
           <a:xfrm rot="16200000">
-            <a:off x="956202" y="2861202"/>
+            <a:off x="61351" y="2556402"/>
             <a:ext cx="1093635" cy="346760"/>
           </a:xfrm>
           <a:prstGeom prst="rect">
@@ -3744,7 +3754,7 @@
         </p:nvSpPr>
         <p:spPr>
           <a:xfrm rot="16200000">
-            <a:off x="1626910" y="2952291"/>
+            <a:off x="732059" y="2647491"/>
             <a:ext cx="270504" cy="175523"/>
           </a:xfrm>
           <a:prstGeom prst="triangle">
@@ -3794,7 +3804,7 @@
         </p:nvCxnSpPr>
         <p:spPr>
           <a:xfrm>
-            <a:off x="2609828" y="3636620"/>
+            <a:off x="1714977" y="3331820"/>
             <a:ext cx="267352" cy="0"/>
           </a:xfrm>
           <a:prstGeom prst="straightConnector1">
@@ -3832,7 +3842,7 @@
         </p:nvCxnSpPr>
         <p:spPr>
           <a:xfrm>
-            <a:off x="910091" y="3040053"/>
+            <a:off x="15240" y="2735253"/>
             <a:ext cx="419548" cy="2860"/>
           </a:xfrm>
           <a:prstGeom prst="bentConnector3">
@@ -3877,7 +3887,7 @@
         </p:nvCxnSpPr>
         <p:spPr>
           <a:xfrm flipV="1">
-            <a:off x="1849924" y="3040052"/>
+            <a:off x="955073" y="2735252"/>
             <a:ext cx="216105" cy="1"/>
           </a:xfrm>
           <a:prstGeom prst="line">
@@ -3916,7 +3926,7 @@
         </p:nvSpPr>
         <p:spPr>
           <a:xfrm>
-            <a:off x="2373780" y="3549930"/>
+            <a:off x="1478929" y="3245130"/>
             <a:ext cx="236048" cy="173380"/>
           </a:xfrm>
           <a:prstGeom prst="flowChartDecision">
@@ -3961,7 +3971,7 @@
         </p:nvSpPr>
         <p:spPr>
           <a:xfrm>
-            <a:off x="2825280" y="2846162"/>
+            <a:off x="1930429" y="2541362"/>
             <a:ext cx="1490560" cy="334856"/>
           </a:xfrm>
           <a:prstGeom prst="rect">
@@ -4020,7 +4030,7 @@
         </p:nvCxnSpPr>
         <p:spPr>
           <a:xfrm>
-            <a:off x="2624360" y="3003033"/>
+            <a:off x="1729509" y="2698233"/>
             <a:ext cx="200920" cy="10557"/>
           </a:xfrm>
           <a:prstGeom prst="straightConnector1">
@@ -4058,7 +4068,7 @@
         </p:nvSpPr>
         <p:spPr>
           <a:xfrm>
-            <a:off x="2388312" y="2916343"/>
+            <a:off x="1493461" y="2611543"/>
             <a:ext cx="236048" cy="173380"/>
           </a:xfrm>
           <a:prstGeom prst="flowChartDecision">
@@ -4103,7 +4113,7 @@
         </p:nvSpPr>
         <p:spPr>
           <a:xfrm>
-            <a:off x="4692650" y="2846162"/>
+            <a:off x="3797799" y="2541362"/>
             <a:ext cx="1156969" cy="346760"/>
           </a:xfrm>
           <a:prstGeom prst="rect">
@@ -4159,7 +4169,7 @@
         </p:nvSpPr>
         <p:spPr>
           <a:xfrm>
-            <a:off x="4324972" y="2920532"/>
+            <a:off x="3430121" y="2615732"/>
             <a:ext cx="236048" cy="173380"/>
           </a:xfrm>
           <a:prstGeom prst="flowChartDecision">
@@ -4206,7 +4216,7 @@
         </p:nvSpPr>
         <p:spPr>
           <a:xfrm>
-            <a:off x="6313677" y="2858066"/>
+            <a:off x="5418826" y="2553266"/>
             <a:ext cx="708186" cy="346760"/>
           </a:xfrm>
           <a:prstGeom prst="rect">
@@ -4262,7 +4272,7 @@
         </p:nvSpPr>
         <p:spPr>
           <a:xfrm>
-            <a:off x="5858751" y="2941676"/>
+            <a:off x="4963900" y="2636876"/>
             <a:ext cx="236048" cy="173380"/>
           </a:xfrm>
           <a:prstGeom prst="flowChartDecision">
@@ -4310,7 +4320,7 @@
         </p:nvCxnSpPr>
         <p:spPr>
           <a:xfrm>
-            <a:off x="6094799" y="3028366"/>
+            <a:off x="5199948" y="2723566"/>
             <a:ext cx="218878" cy="3080"/>
           </a:xfrm>
           <a:prstGeom prst="bentConnector3">
@@ -4348,7 +4358,7 @@
         </p:nvSpPr>
         <p:spPr>
           <a:xfrm>
-            <a:off x="7712396" y="2564238"/>
+            <a:off x="6817545" y="2259438"/>
             <a:ext cx="893949" cy="285783"/>
           </a:xfrm>
           <a:prstGeom prst="rect">
@@ -4404,7 +4414,7 @@
         </p:nvSpPr>
         <p:spPr>
           <a:xfrm>
-            <a:off x="7041947" y="2948201"/>
+            <a:off x="6147096" y="2643401"/>
             <a:ext cx="236048" cy="173380"/>
           </a:xfrm>
           <a:prstGeom prst="flowChartDecision">
@@ -4453,7 +4463,7 @@
         </p:nvCxnSpPr>
         <p:spPr>
           <a:xfrm flipV="1">
-            <a:off x="7277995" y="2706821"/>
+            <a:off x="6383144" y="2402021"/>
             <a:ext cx="434402" cy="327761"/>
           </a:xfrm>
           <a:prstGeom prst="bentConnector3">
@@ -4491,7 +4501,7 @@
         </p:nvSpPr>
         <p:spPr>
           <a:xfrm>
-            <a:off x="7712396" y="2887216"/>
+            <a:off x="6817545" y="2582416"/>
             <a:ext cx="893949" cy="285783"/>
           </a:xfrm>
           <a:prstGeom prst="rect">
@@ -4551,7 +4561,7 @@
         </p:nvCxnSpPr>
         <p:spPr>
           <a:xfrm flipV="1">
-            <a:off x="7277995" y="3030108"/>
+            <a:off x="6383144" y="2725308"/>
             <a:ext cx="434401" cy="4783"/>
           </a:xfrm>
           <a:prstGeom prst="bentConnector3">
@@ -4589,7 +4599,7 @@
         </p:nvSpPr>
         <p:spPr>
           <a:xfrm>
-            <a:off x="7712396" y="3210194"/>
+            <a:off x="6817545" y="2905394"/>
             <a:ext cx="893949" cy="285783"/>
           </a:xfrm>
           <a:prstGeom prst="rect">
@@ -4649,7 +4659,7 @@
         </p:nvCxnSpPr>
         <p:spPr>
           <a:xfrm>
-            <a:off x="7277995" y="3034891"/>
+            <a:off x="6383144" y="2730091"/>
             <a:ext cx="434401" cy="318195"/>
           </a:xfrm>
           <a:prstGeom prst="bentConnector3">
@@ -4687,7 +4697,7 @@
         </p:nvSpPr>
         <p:spPr>
           <a:xfrm>
-            <a:off x="7712396" y="3533171"/>
+            <a:off x="6817545" y="3228371"/>
             <a:ext cx="893949" cy="285783"/>
           </a:xfrm>
           <a:prstGeom prst="rect">
@@ -4747,7 +4757,7 @@
         </p:nvCxnSpPr>
         <p:spPr>
           <a:xfrm>
-            <a:off x="7277995" y="3034891"/>
+            <a:off x="6383144" y="2730091"/>
             <a:ext cx="434401" cy="641172"/>
           </a:xfrm>
           <a:prstGeom prst="bentConnector3">
@@ -4787,7 +4797,7 @@
         </p:nvCxnSpPr>
         <p:spPr>
           <a:xfrm rot="5400000">
-            <a:off x="3553611" y="2687559"/>
+            <a:off x="2658760" y="2382759"/>
             <a:ext cx="293825" cy="5938"/>
           </a:xfrm>
           <a:prstGeom prst="bentConnector3">
@@ -4828,7 +4838,7 @@
         </p:nvSpPr>
         <p:spPr>
           <a:xfrm rot="10800000" flipV="1">
-            <a:off x="3562299" y="2386554"/>
+            <a:off x="2667448" y="2081754"/>
             <a:ext cx="282387" cy="157062"/>
           </a:xfrm>
           <a:prstGeom prst="triangle">
@@ -4876,7 +4886,7 @@
         </p:nvSpPr>
         <p:spPr>
           <a:xfrm>
-            <a:off x="1260922" y="1998350"/>
+            <a:off x="366071" y="1693550"/>
             <a:ext cx="1443661" cy="364396"/>
           </a:xfrm>
           <a:prstGeom prst="rect">
@@ -4947,7 +4957,7 @@
         </p:nvSpPr>
         <p:spPr>
           <a:xfrm rot="16200000">
-            <a:off x="6362886" y="3586305"/>
+            <a:off x="5468035" y="3281505"/>
             <a:ext cx="881018" cy="261610"/>
           </a:xfrm>
           <a:prstGeom prst="rect">
@@ -4986,7 +4996,7 @@
         </p:nvSpPr>
         <p:spPr>
           <a:xfrm>
-            <a:off x="2057401" y="4239491"/>
+            <a:off x="1162550" y="3934691"/>
             <a:ext cx="1066800" cy="346760"/>
           </a:xfrm>
           <a:prstGeom prst="rect">
@@ -5026,6 +5036,14 @@
               </a:rPr>
               <a:t>&lt;&lt;interface&gt;&gt;</a:t>
             </a:r>
+            <a:r>
+              <a:rPr lang="en-US" sz="1050">
+                <a:solidFill>
+                  <a:srgbClr val="7030A0"/>
+                </a:solidFill>
+              </a:rPr>
+              <a:t/>
+            </a:r>
             <a:br>
               <a:rPr lang="en-US" sz="1050">
                 <a:solidFill>
@@ -5060,7 +5078,7 @@
         </p:nvCxnSpPr>
         <p:spPr>
           <a:xfrm rot="16200000" flipH="1">
-            <a:off x="1364475" y="3719944"/>
+            <a:off x="469624" y="3415144"/>
             <a:ext cx="831471" cy="554381"/>
           </a:xfrm>
           <a:prstGeom prst="bentConnector2">
@@ -5099,7 +5117,7 @@
         </p:nvSpPr>
         <p:spPr>
           <a:xfrm>
-            <a:off x="4429979" y="3111479"/>
+            <a:off x="3535128" y="2806679"/>
             <a:ext cx="189257" cy="178683"/>
           </a:xfrm>
           <a:prstGeom prst="rect">
@@ -5138,7 +5156,7 @@
         </p:nvSpPr>
         <p:spPr>
           <a:xfrm>
-            <a:off x="6135256" y="3097917"/>
+            <a:off x="5240405" y="2793117"/>
             <a:ext cx="189257" cy="178683"/>
           </a:xfrm>
           <a:prstGeom prst="rect">
@@ -5177,7 +5195,7 @@
         </p:nvSpPr>
         <p:spPr>
           <a:xfrm>
-            <a:off x="2573394" y="2756715"/>
+            <a:off x="1678543" y="2451915"/>
             <a:ext cx="170110" cy="137542"/>
           </a:xfrm>
           <a:prstGeom prst="rect">
@@ -5216,7 +5234,7 @@
         </p:nvSpPr>
         <p:spPr>
           <a:xfrm>
-            <a:off x="2707070" y="3667737"/>
+            <a:off x="1812219" y="3362937"/>
             <a:ext cx="189257" cy="178683"/>
           </a:xfrm>
           <a:prstGeom prst="rect">
@@ -5255,7 +5273,7 @@
         </p:nvSpPr>
         <p:spPr>
           <a:xfrm>
-            <a:off x="6449896" y="3204826"/>
+            <a:off x="5555045" y="2900026"/>
             <a:ext cx="189257" cy="178683"/>
           </a:xfrm>
           <a:prstGeom prst="rect">
@@ -5291,7 +5309,7 @@
           <p:cNvPr id="52" name="Rectangle 8">
             <a:extLst>
               <a:ext uri="{FF2B5EF4-FFF2-40B4-BE49-F238E27FC236}">
-                <a16:creationId xmlns:a16="http://schemas.microsoft.com/office/drawing/2014/main" id="{ABDCDBD2-131A-4B66-A2F2-43BBEE82C773}"/>
+                <a16:creationId xmlns:a16="http://schemas.microsoft.com/office/drawing/2014/main" xmlns="" id="{ABDCDBD2-131A-4B66-A2F2-43BBEE82C773}"/>
               </a:ext>
             </a:extLst>
           </p:cNvPr>
@@ -5300,7 +5318,7 @@
         </p:nvSpPr>
         <p:spPr>
           <a:xfrm>
-            <a:off x="7712396" y="2228817"/>
+            <a:off x="6817545" y="1924017"/>
             <a:ext cx="893949" cy="285783"/>
           </a:xfrm>
           <a:prstGeom prst="rect">
@@ -5353,7 +5371,7 @@
           <p:cNvPr id="53" name="Elbow Connector 78">
             <a:extLst>
               <a:ext uri="{FF2B5EF4-FFF2-40B4-BE49-F238E27FC236}">
-                <a16:creationId xmlns:a16="http://schemas.microsoft.com/office/drawing/2014/main" id="{B97967F8-618A-448B-81FD-CDFD4AF0EC64}"/>
+                <a16:creationId xmlns:a16="http://schemas.microsoft.com/office/drawing/2014/main" xmlns="" id="{B97967F8-618A-448B-81FD-CDFD4AF0EC64}"/>
               </a:ext>
             </a:extLst>
           </p:cNvPr>
@@ -5366,7 +5384,7 @@
         </p:nvCxnSpPr>
         <p:spPr>
           <a:xfrm flipV="1">
-            <a:off x="7277995" y="2371709"/>
+            <a:off x="6383144" y="2066909"/>
             <a:ext cx="434401" cy="663182"/>
           </a:xfrm>
           <a:prstGeom prst="bentConnector3">
@@ -5403,7 +5421,7 @@
           <p:cNvPr id="50" name="TextBox 49">
             <a:extLst>
               <a:ext uri="{FF2B5EF4-FFF2-40B4-BE49-F238E27FC236}">
-                <a16:creationId xmlns:a16="http://schemas.microsoft.com/office/drawing/2014/main" id="{B3FA9D57-880F-49C4-AD0B-A64E30D6F403}"/>
+                <a16:creationId xmlns:a16="http://schemas.microsoft.com/office/drawing/2014/main" xmlns="" id="{B3FA9D57-880F-49C4-AD0B-A64E30D6F403}"/>
               </a:ext>
             </a:extLst>
           </p:cNvPr>
@@ -5412,7 +5430,7 @@
         </p:nvSpPr>
         <p:spPr>
           <a:xfrm>
-            <a:off x="7466243" y="2255711"/>
+            <a:off x="6571392" y="1950911"/>
             <a:ext cx="189257" cy="178683"/>
           </a:xfrm>
           <a:prstGeom prst="rect">
@@ -5451,7 +5469,7 @@
         </p:nvSpPr>
         <p:spPr>
           <a:xfrm>
-            <a:off x="3170181" y="1998350"/>
+            <a:off x="2275330" y="1693550"/>
             <a:ext cx="1060683" cy="364396"/>
           </a:xfrm>
           <a:prstGeom prst="rect">
@@ -5510,7 +5528,7 @@
         </p:nvCxnSpPr>
         <p:spPr>
           <a:xfrm>
-            <a:off x="4324972" y="3007222"/>
+            <a:off x="3430121" y="2702422"/>
             <a:ext cx="367678" cy="12320"/>
           </a:xfrm>
           <a:prstGeom prst="straightConnector1">
@@ -5548,7 +5566,7 @@
         </p:nvSpPr>
         <p:spPr>
           <a:xfrm rot="16200000">
-            <a:off x="2669073" y="2069158"/>
+            <a:off x="1774222" y="1764358"/>
             <a:ext cx="271014" cy="187417"/>
           </a:xfrm>
           <a:prstGeom prst="triangle">
@@ -5603,7 +5621,7 @@
         </p:nvCxnSpPr>
         <p:spPr>
           <a:xfrm>
-            <a:off x="2898289" y="2177727"/>
+            <a:off x="2003438" y="1872927"/>
             <a:ext cx="271892" cy="2821"/>
           </a:xfrm>
           <a:prstGeom prst="bentConnector3">
@@ -5641,7 +5659,7 @@
           <p:cNvPr id="56" name="Rectangle 8">
             <a:extLst>
               <a:ext uri="{FF2B5EF4-FFF2-40B4-BE49-F238E27FC236}">
-                <a16:creationId xmlns:a16="http://schemas.microsoft.com/office/drawing/2014/main" id="{5D3CD1F5-C42A-49F4-A507-1CAF83F1EDE8}"/>
+                <a16:creationId xmlns:a16="http://schemas.microsoft.com/office/drawing/2014/main" xmlns="" id="{5D3CD1F5-C42A-49F4-A507-1CAF83F1EDE8}"/>
               </a:ext>
             </a:extLst>
           </p:cNvPr>
@@ -5650,7 +5668,7 @@
         </p:nvSpPr>
         <p:spPr>
           <a:xfrm>
-            <a:off x="7716652" y="3871836"/>
+            <a:off x="6821801" y="3567036"/>
             <a:ext cx="893949" cy="285783"/>
           </a:xfrm>
           <a:prstGeom prst="rect">
@@ -5703,7 +5721,7 @@
           <p:cNvPr id="57" name="Rectangle 8">
             <a:extLst>
               <a:ext uri="{FF2B5EF4-FFF2-40B4-BE49-F238E27FC236}">
-                <a16:creationId xmlns:a16="http://schemas.microsoft.com/office/drawing/2014/main" id="{1D68D65E-3CA3-41FD-B787-5D4459E1265A}"/>
+                <a16:creationId xmlns:a16="http://schemas.microsoft.com/office/drawing/2014/main" xmlns="" id="{1D68D65E-3CA3-41FD-B787-5D4459E1265A}"/>
               </a:ext>
             </a:extLst>
           </p:cNvPr>
@@ -5712,7 +5730,7 @@
         </p:nvSpPr>
         <p:spPr>
           <a:xfrm>
-            <a:off x="7712396" y="4207257"/>
+            <a:off x="6817545" y="3902457"/>
             <a:ext cx="893949" cy="285783"/>
           </a:xfrm>
           <a:prstGeom prst="rect">
@@ -5765,7 +5783,7 @@
           <p:cNvPr id="59" name="Rectangle 8">
             <a:extLst>
               <a:ext uri="{FF2B5EF4-FFF2-40B4-BE49-F238E27FC236}">
-                <a16:creationId xmlns:a16="http://schemas.microsoft.com/office/drawing/2014/main" id="{3E19803D-2A74-4410-BF6E-CCFF0A1FFA75}"/>
+                <a16:creationId xmlns:a16="http://schemas.microsoft.com/office/drawing/2014/main" xmlns="" id="{3E19803D-2A74-4410-BF6E-CCFF0A1FFA75}"/>
               </a:ext>
             </a:extLst>
           </p:cNvPr>
@@ -5774,7 +5792,7 @@
         </p:nvSpPr>
         <p:spPr>
           <a:xfrm>
-            <a:off x="7712396" y="1902080"/>
+            <a:off x="6817545" y="1597280"/>
             <a:ext cx="893949" cy="285783"/>
           </a:xfrm>
           <a:prstGeom prst="rect">
@@ -5827,7 +5845,7 @@
           <p:cNvPr id="71" name="Elbow Connector 78">
             <a:extLst>
               <a:ext uri="{FF2B5EF4-FFF2-40B4-BE49-F238E27FC236}">
-                <a16:creationId xmlns:a16="http://schemas.microsoft.com/office/drawing/2014/main" id="{6EA0EA1D-B248-42D1-AC98-63B9E6A4BF36}"/>
+                <a16:creationId xmlns:a16="http://schemas.microsoft.com/office/drawing/2014/main" xmlns="" id="{6EA0EA1D-B248-42D1-AC98-63B9E6A4BF36}"/>
               </a:ext>
             </a:extLst>
           </p:cNvPr>
@@ -5840,7 +5858,7 @@
         </p:nvCxnSpPr>
         <p:spPr>
           <a:xfrm flipV="1">
-            <a:off x="7277995" y="2044972"/>
+            <a:off x="6383144" y="1740172"/>
             <a:ext cx="434401" cy="989919"/>
           </a:xfrm>
           <a:prstGeom prst="bentConnector3">
@@ -5877,7 +5895,7 @@
           <p:cNvPr id="72" name="Elbow Connector 78">
             <a:extLst>
               <a:ext uri="{FF2B5EF4-FFF2-40B4-BE49-F238E27FC236}">
-                <a16:creationId xmlns:a16="http://schemas.microsoft.com/office/drawing/2014/main" id="{27906B74-66F0-465A-9245-F2704DCBA9B5}"/>
+                <a16:creationId xmlns:a16="http://schemas.microsoft.com/office/drawing/2014/main" xmlns="" id="{27906B74-66F0-465A-9245-F2704DCBA9B5}"/>
               </a:ext>
             </a:extLst>
           </p:cNvPr>
@@ -5890,7 +5908,7 @@
         </p:nvCxnSpPr>
         <p:spPr>
           <a:xfrm>
-            <a:off x="7277995" y="3034891"/>
+            <a:off x="6383144" y="2730091"/>
             <a:ext cx="438657" cy="979837"/>
           </a:xfrm>
           <a:prstGeom prst="bentConnector3">
@@ -5927,7 +5945,7 @@
           <p:cNvPr id="73" name="Elbow Connector 78">
             <a:extLst>
               <a:ext uri="{FF2B5EF4-FFF2-40B4-BE49-F238E27FC236}">
-                <a16:creationId xmlns:a16="http://schemas.microsoft.com/office/drawing/2014/main" id="{4EDEB23F-0729-4572-8C7B-FB6847CB8784}"/>
+                <a16:creationId xmlns:a16="http://schemas.microsoft.com/office/drawing/2014/main" xmlns="" id="{4EDEB23F-0729-4572-8C7B-FB6847CB8784}"/>
               </a:ext>
             </a:extLst>
           </p:cNvPr>
@@ -5940,7 +5958,7 @@
         </p:nvCxnSpPr>
         <p:spPr>
           <a:xfrm>
-            <a:off x="7277995" y="3034891"/>
+            <a:off x="6383144" y="2730091"/>
             <a:ext cx="434401" cy="1315258"/>
           </a:xfrm>
           <a:prstGeom prst="bentConnector3">
@@ -5977,7 +5995,7 @@
           <p:cNvPr id="74" name="Rectangle 8">
             <a:extLst>
               <a:ext uri="{FF2B5EF4-FFF2-40B4-BE49-F238E27FC236}">
-                <a16:creationId xmlns:a16="http://schemas.microsoft.com/office/drawing/2014/main" id="{3E28DE11-038B-4078-A00D-D599C814C997}"/>
+                <a16:creationId xmlns:a16="http://schemas.microsoft.com/office/drawing/2014/main" xmlns="" id="{3E28DE11-038B-4078-A00D-D599C814C997}"/>
               </a:ext>
             </a:extLst>
           </p:cNvPr>
@@ -5986,7 +6004,7 @@
         </p:nvSpPr>
         <p:spPr>
           <a:xfrm>
-            <a:off x="7712396" y="4542928"/>
+            <a:off x="6817545" y="4238128"/>
             <a:ext cx="893949" cy="285783"/>
           </a:xfrm>
           <a:prstGeom prst="rect">
@@ -6039,20 +6057,18 @@
           <p:cNvPr id="77" name="Elbow Connector 78">
             <a:extLst>
               <a:ext uri="{FF2B5EF4-FFF2-40B4-BE49-F238E27FC236}">
-                <a16:creationId xmlns:a16="http://schemas.microsoft.com/office/drawing/2014/main" id="{8A4DBA9A-CB1B-41B2-8EE8-FAE1722D3B12}"/>
+                <a16:creationId xmlns:a16="http://schemas.microsoft.com/office/drawing/2014/main" xmlns="" id="{8A4DBA9A-CB1B-41B2-8EE8-FAE1722D3B12}"/>
               </a:ext>
             </a:extLst>
           </p:cNvPr>
           <p:cNvCxnSpPr>
             <a:cxnSpLocks/>
-            <a:stCxn id="78" idx="3"/>
-            <a:endCxn id="74" idx="1"/>
           </p:cNvCxnSpPr>
           <p:nvPr/>
         </p:nvCxnSpPr>
         <p:spPr>
           <a:xfrm>
-            <a:off x="7277995" y="3034891"/>
+            <a:off x="6380316" y="2730091"/>
             <a:ext cx="434401" cy="1650929"/>
           </a:xfrm>
           <a:prstGeom prst="bentConnector3">
@@ -6081,6 +6097,774 @@
           </a:effectRef>
           <a:fontRef idx="minor">
             <a:schemeClr val="dk1"/>
+          </a:fontRef>
+        </p:style>
+      </p:cxnSp>
+      <p:sp>
+        <p:nvSpPr>
+          <p:cNvPr id="67" name="Rectangle 8">
+            <a:extLst>
+              <a:ext uri="{FF2B5EF4-FFF2-40B4-BE49-F238E27FC236}">
+                <a16:creationId xmlns:a16="http://schemas.microsoft.com/office/drawing/2014/main" xmlns="" id="{3E28DE11-038B-4078-A00D-D599C814C997}"/>
+              </a:ext>
+            </a:extLst>
+          </p:cNvPr>
+          <p:cNvSpPr/>
+          <p:nvPr/>
+        </p:nvSpPr>
+        <p:spPr>
+          <a:xfrm>
+            <a:off x="6821801" y="4573799"/>
+            <a:ext cx="893949" cy="285783"/>
+          </a:xfrm>
+          <a:prstGeom prst="rect">
+            <a:avLst/>
+          </a:prstGeom>
+          <a:ln w="19050">
+            <a:solidFill>
+              <a:srgbClr val="7030A0"/>
+            </a:solidFill>
+          </a:ln>
+          <a:effectLst/>
+        </p:spPr>
+        <p:style>
+          <a:lnRef idx="1">
+            <a:schemeClr val="accent4"/>
+          </a:lnRef>
+          <a:fillRef idx="2">
+            <a:schemeClr val="accent4"/>
+          </a:fillRef>
+          <a:effectRef idx="1">
+            <a:schemeClr val="accent4"/>
+          </a:effectRef>
+          <a:fontRef idx="minor">
+            <a:schemeClr val="dk1"/>
+          </a:fontRef>
+        </p:style>
+        <p:txBody>
+          <a:bodyPr rtlCol="0" anchor="ctr"/>
+          <a:lstStyle/>
+          <a:p>
+            <a:pPr algn="ctr"/>
+            <a:r>
+              <a:rPr lang="en-US" sz="1050" dirty="0" smtClean="0">
+                <a:solidFill>
+                  <a:srgbClr val="7030A0"/>
+                </a:solidFill>
+              </a:rPr>
+              <a:t>Working Rate</a:t>
+            </a:r>
+            <a:endParaRPr lang="en-SG" sz="1050" dirty="0">
+              <a:solidFill>
+                <a:srgbClr val="7030A0"/>
+              </a:solidFill>
+            </a:endParaRPr>
+          </a:p>
+        </p:txBody>
+      </p:sp>
+      <p:sp>
+        <p:nvSpPr>
+          <p:cNvPr id="82" name="Rectangle 8">
+            <a:extLst>
+              <a:ext uri="{FF2B5EF4-FFF2-40B4-BE49-F238E27FC236}">
+                <a16:creationId xmlns:a16="http://schemas.microsoft.com/office/drawing/2014/main" xmlns="" id="{3E28DE11-038B-4078-A00D-D599C814C997}"/>
+              </a:ext>
+            </a:extLst>
+          </p:cNvPr>
+          <p:cNvSpPr/>
+          <p:nvPr/>
+        </p:nvSpPr>
+        <p:spPr>
+          <a:xfrm>
+            <a:off x="6821800" y="4912344"/>
+            <a:ext cx="893949" cy="285783"/>
+          </a:xfrm>
+          <a:prstGeom prst="rect">
+            <a:avLst/>
+          </a:prstGeom>
+          <a:ln w="19050">
+            <a:solidFill>
+              <a:srgbClr val="7030A0"/>
+            </a:solidFill>
+          </a:ln>
+          <a:effectLst/>
+        </p:spPr>
+        <p:style>
+          <a:lnRef idx="1">
+            <a:schemeClr val="accent4"/>
+          </a:lnRef>
+          <a:fillRef idx="2">
+            <a:schemeClr val="accent4"/>
+          </a:fillRef>
+          <a:effectRef idx="1">
+            <a:schemeClr val="accent4"/>
+          </a:effectRef>
+          <a:fontRef idx="minor">
+            <a:schemeClr val="dk1"/>
+          </a:fontRef>
+        </p:style>
+        <p:txBody>
+          <a:bodyPr rtlCol="0" anchor="ctr"/>
+          <a:lstStyle/>
+          <a:p>
+            <a:pPr algn="ctr"/>
+            <a:r>
+              <a:rPr lang="en-US" sz="1050" dirty="0" smtClean="0">
+                <a:solidFill>
+                  <a:srgbClr val="7030A0"/>
+                </a:solidFill>
+              </a:rPr>
+              <a:t>Checked In Time</a:t>
+            </a:r>
+            <a:endParaRPr lang="en-SG" sz="1050" dirty="0">
+              <a:solidFill>
+                <a:srgbClr val="7030A0"/>
+              </a:solidFill>
+            </a:endParaRPr>
+          </a:p>
+        </p:txBody>
+      </p:sp>
+      <p:sp>
+        <p:nvSpPr>
+          <p:cNvPr id="87" name="Rectangle 8">
+            <a:extLst>
+              <a:ext uri="{FF2B5EF4-FFF2-40B4-BE49-F238E27FC236}">
+                <a16:creationId xmlns:a16="http://schemas.microsoft.com/office/drawing/2014/main" xmlns="" id="{3E28DE11-038B-4078-A00D-D599C814C997}"/>
+              </a:ext>
+            </a:extLst>
+          </p:cNvPr>
+          <p:cNvSpPr/>
+          <p:nvPr/>
+        </p:nvSpPr>
+        <p:spPr>
+          <a:xfrm>
+            <a:off x="6829957" y="5251009"/>
+            <a:ext cx="893949" cy="285783"/>
+          </a:xfrm>
+          <a:prstGeom prst="rect">
+            <a:avLst/>
+          </a:prstGeom>
+          <a:ln w="19050">
+            <a:solidFill>
+              <a:srgbClr val="7030A0"/>
+            </a:solidFill>
+          </a:ln>
+          <a:effectLst/>
+        </p:spPr>
+        <p:style>
+          <a:lnRef idx="1">
+            <a:schemeClr val="accent4"/>
+          </a:lnRef>
+          <a:fillRef idx="2">
+            <a:schemeClr val="accent4"/>
+          </a:fillRef>
+          <a:effectRef idx="1">
+            <a:schemeClr val="accent4"/>
+          </a:effectRef>
+          <a:fontRef idx="minor">
+            <a:schemeClr val="dk1"/>
+          </a:fontRef>
+        </p:style>
+        <p:txBody>
+          <a:bodyPr rtlCol="0" anchor="ctr"/>
+          <a:lstStyle/>
+          <a:p>
+            <a:pPr algn="ctr"/>
+            <a:r>
+              <a:rPr lang="en-US" sz="1050" dirty="0" smtClean="0">
+                <a:solidFill>
+                  <a:srgbClr val="7030A0"/>
+                </a:solidFill>
+              </a:rPr>
+              <a:t>Mode</a:t>
+            </a:r>
+            <a:endParaRPr lang="en-SG" sz="1050" dirty="0">
+              <a:solidFill>
+                <a:srgbClr val="7030A0"/>
+              </a:solidFill>
+            </a:endParaRPr>
+          </a:p>
+        </p:txBody>
+      </p:sp>
+      <p:sp>
+        <p:nvSpPr>
+          <p:cNvPr id="88" name="Rectangle 8">
+            <a:extLst>
+              <a:ext uri="{FF2B5EF4-FFF2-40B4-BE49-F238E27FC236}">
+                <a16:creationId xmlns:a16="http://schemas.microsoft.com/office/drawing/2014/main" xmlns="" id="{3E28DE11-038B-4078-A00D-D599C814C997}"/>
+              </a:ext>
+            </a:extLst>
+          </p:cNvPr>
+          <p:cNvSpPr/>
+          <p:nvPr/>
+        </p:nvSpPr>
+        <p:spPr>
+          <a:xfrm>
+            <a:off x="6821800" y="5586430"/>
+            <a:ext cx="893949" cy="285783"/>
+          </a:xfrm>
+          <a:prstGeom prst="rect">
+            <a:avLst/>
+          </a:prstGeom>
+          <a:ln w="19050">
+            <a:solidFill>
+              <a:srgbClr val="7030A0"/>
+            </a:solidFill>
+          </a:ln>
+          <a:effectLst/>
+        </p:spPr>
+        <p:style>
+          <a:lnRef idx="1">
+            <a:schemeClr val="accent4"/>
+          </a:lnRef>
+          <a:fillRef idx="2">
+            <a:schemeClr val="accent4"/>
+          </a:fillRef>
+          <a:effectRef idx="1">
+            <a:schemeClr val="accent4"/>
+          </a:effectRef>
+          <a:fontRef idx="minor">
+            <a:schemeClr val="dk1"/>
+          </a:fontRef>
+        </p:style>
+        <p:txBody>
+          <a:bodyPr rtlCol="0" anchor="ctr"/>
+          <a:lstStyle/>
+          <a:p>
+            <a:pPr algn="ctr"/>
+            <a:r>
+              <a:rPr lang="en-US" sz="1050" dirty="0" smtClean="0">
+                <a:solidFill>
+                  <a:srgbClr val="7030A0"/>
+                </a:solidFill>
+              </a:rPr>
+              <a:t>Schedule</a:t>
+            </a:r>
+            <a:endParaRPr lang="en-SG" sz="1050" dirty="0">
+              <a:solidFill>
+                <a:srgbClr val="7030A0"/>
+              </a:solidFill>
+            </a:endParaRPr>
+          </a:p>
+        </p:txBody>
+      </p:sp>
+      <p:cxnSp>
+        <p:nvCxnSpPr>
+          <p:cNvPr id="89" name="Elbow Connector 78">
+            <a:extLst>
+              <a:ext uri="{FF2B5EF4-FFF2-40B4-BE49-F238E27FC236}">
+                <a16:creationId xmlns:a16="http://schemas.microsoft.com/office/drawing/2014/main" xmlns="" id="{8A4DBA9A-CB1B-41B2-8EE8-FAE1722D3B12}"/>
+              </a:ext>
+            </a:extLst>
+          </p:cNvPr>
+          <p:cNvCxnSpPr>
+            <a:cxnSpLocks/>
+            <a:endCxn id="67" idx="1"/>
+          </p:cNvCxnSpPr>
+          <p:nvPr/>
+        </p:nvCxnSpPr>
+        <p:spPr>
+          <a:xfrm rot="16200000" flipH="1">
+            <a:off x="5716360" y="3611250"/>
+            <a:ext cx="1986598" cy="224283"/>
+          </a:xfrm>
+          <a:prstGeom prst="bentConnector2">
+            <a:avLst/>
+          </a:prstGeom>
+          <a:ln w="19050">
+            <a:solidFill>
+              <a:srgbClr val="7030A0"/>
+            </a:solidFill>
+            <a:headEnd type="none" w="med" len="med"/>
+            <a:tailEnd type="arrow" w="med" len="med"/>
+          </a:ln>
+          <a:effectLst/>
+        </p:spPr>
+        <p:style>
+          <a:lnRef idx="1">
+            <a:schemeClr val="accent2"/>
+          </a:lnRef>
+          <a:fillRef idx="2">
+            <a:schemeClr val="accent2"/>
+          </a:fillRef>
+          <a:effectRef idx="1">
+            <a:schemeClr val="accent2"/>
+          </a:effectRef>
+          <a:fontRef idx="minor">
+            <a:schemeClr val="dk1"/>
+          </a:fontRef>
+        </p:style>
+      </p:cxnSp>
+      <p:cxnSp>
+        <p:nvCxnSpPr>
+          <p:cNvPr id="90" name="Elbow Connector 78">
+            <a:extLst>
+              <a:ext uri="{FF2B5EF4-FFF2-40B4-BE49-F238E27FC236}">
+                <a16:creationId xmlns:a16="http://schemas.microsoft.com/office/drawing/2014/main" xmlns="" id="{8A4DBA9A-CB1B-41B2-8EE8-FAE1722D3B12}"/>
+              </a:ext>
+            </a:extLst>
+          </p:cNvPr>
+          <p:cNvCxnSpPr>
+            <a:cxnSpLocks/>
+            <a:endCxn id="82" idx="1"/>
+          </p:cNvCxnSpPr>
+          <p:nvPr/>
+        </p:nvCxnSpPr>
+        <p:spPr>
+          <a:xfrm rot="16200000" flipH="1">
+            <a:off x="5623162" y="3856597"/>
+            <a:ext cx="2172993" cy="224283"/>
+          </a:xfrm>
+          <a:prstGeom prst="bentConnector2">
+            <a:avLst/>
+          </a:prstGeom>
+          <a:ln w="19050">
+            <a:solidFill>
+              <a:srgbClr val="7030A0"/>
+            </a:solidFill>
+            <a:headEnd type="none" w="med" len="med"/>
+            <a:tailEnd type="arrow" w="med" len="med"/>
+          </a:ln>
+          <a:effectLst/>
+        </p:spPr>
+        <p:style>
+          <a:lnRef idx="1">
+            <a:schemeClr val="accent2"/>
+          </a:lnRef>
+          <a:fillRef idx="2">
+            <a:schemeClr val="accent2"/>
+          </a:fillRef>
+          <a:effectRef idx="1">
+            <a:schemeClr val="accent2"/>
+          </a:effectRef>
+          <a:fontRef idx="minor">
+            <a:schemeClr val="dk1"/>
+          </a:fontRef>
+        </p:style>
+      </p:cxnSp>
+      <p:cxnSp>
+        <p:nvCxnSpPr>
+          <p:cNvPr id="91" name="Elbow Connector 78">
+            <a:extLst>
+              <a:ext uri="{FF2B5EF4-FFF2-40B4-BE49-F238E27FC236}">
+                <a16:creationId xmlns:a16="http://schemas.microsoft.com/office/drawing/2014/main" xmlns="" id="{8A4DBA9A-CB1B-41B2-8EE8-FAE1722D3B12}"/>
+              </a:ext>
+            </a:extLst>
+          </p:cNvPr>
+          <p:cNvCxnSpPr>
+            <a:cxnSpLocks/>
+          </p:cNvCxnSpPr>
+          <p:nvPr/>
+        </p:nvCxnSpPr>
+        <p:spPr>
+          <a:xfrm rot="16200000" flipH="1">
+            <a:off x="5716360" y="4304867"/>
+            <a:ext cx="1986598" cy="224283"/>
+          </a:xfrm>
+          <a:prstGeom prst="bentConnector2">
+            <a:avLst/>
+          </a:prstGeom>
+          <a:ln w="19050">
+            <a:solidFill>
+              <a:srgbClr val="7030A0"/>
+            </a:solidFill>
+            <a:headEnd type="none" w="med" len="med"/>
+            <a:tailEnd type="arrow" w="med" len="med"/>
+          </a:ln>
+          <a:effectLst/>
+        </p:spPr>
+        <p:style>
+          <a:lnRef idx="1">
+            <a:schemeClr val="accent2"/>
+          </a:lnRef>
+          <a:fillRef idx="2">
+            <a:schemeClr val="accent2"/>
+          </a:fillRef>
+          <a:effectRef idx="1">
+            <a:schemeClr val="accent2"/>
+          </a:effectRef>
+          <a:fontRef idx="minor">
+            <a:schemeClr val="dk1"/>
+          </a:fontRef>
+        </p:style>
+      </p:cxnSp>
+      <p:cxnSp>
+        <p:nvCxnSpPr>
+          <p:cNvPr id="92" name="Elbow Connector 78">
+            <a:extLst>
+              <a:ext uri="{FF2B5EF4-FFF2-40B4-BE49-F238E27FC236}">
+                <a16:creationId xmlns:a16="http://schemas.microsoft.com/office/drawing/2014/main" xmlns="" id="{8A4DBA9A-CB1B-41B2-8EE8-FAE1722D3B12}"/>
+              </a:ext>
+            </a:extLst>
+          </p:cNvPr>
+          <p:cNvCxnSpPr>
+            <a:cxnSpLocks/>
+          </p:cNvCxnSpPr>
+          <p:nvPr/>
+        </p:nvCxnSpPr>
+        <p:spPr>
+          <a:xfrm rot="16200000" flipH="1">
+            <a:off x="5715646" y="4652404"/>
+            <a:ext cx="1986598" cy="224283"/>
+          </a:xfrm>
+          <a:prstGeom prst="bentConnector2">
+            <a:avLst/>
+          </a:prstGeom>
+          <a:ln w="19050">
+            <a:solidFill>
+              <a:srgbClr val="7030A0"/>
+            </a:solidFill>
+            <a:headEnd type="none" w="med" len="med"/>
+            <a:tailEnd type="arrow" w="med" len="med"/>
+          </a:ln>
+          <a:effectLst/>
+        </p:spPr>
+        <p:style>
+          <a:lnRef idx="1">
+            <a:schemeClr val="accent2"/>
+          </a:lnRef>
+          <a:fillRef idx="2">
+            <a:schemeClr val="accent2"/>
+          </a:fillRef>
+          <a:effectRef idx="1">
+            <a:schemeClr val="accent2"/>
+          </a:effectRef>
+          <a:fontRef idx="minor">
+            <a:schemeClr val="dk1"/>
+          </a:fontRef>
+        </p:style>
+      </p:cxnSp>
+      <p:sp>
+        <p:nvSpPr>
+          <p:cNvPr id="93" name="Rectangle 8">
+            <a:extLst>
+              <a:ext uri="{FF2B5EF4-FFF2-40B4-BE49-F238E27FC236}">
+                <a16:creationId xmlns:a16="http://schemas.microsoft.com/office/drawing/2014/main" xmlns="" id="{3E28DE11-038B-4078-A00D-D599C814C997}"/>
+              </a:ext>
+            </a:extLst>
+          </p:cNvPr>
+          <p:cNvSpPr/>
+          <p:nvPr/>
+        </p:nvSpPr>
+        <p:spPr>
+          <a:xfrm>
+            <a:off x="8005455" y="5586430"/>
+            <a:ext cx="893949" cy="285783"/>
+          </a:xfrm>
+          <a:prstGeom prst="rect">
+            <a:avLst/>
+          </a:prstGeom>
+          <a:ln w="19050">
+            <a:solidFill>
+              <a:srgbClr val="7030A0"/>
+            </a:solidFill>
+          </a:ln>
+          <a:effectLst/>
+        </p:spPr>
+        <p:style>
+          <a:lnRef idx="1">
+            <a:schemeClr val="accent4"/>
+          </a:lnRef>
+          <a:fillRef idx="2">
+            <a:schemeClr val="accent4"/>
+          </a:fillRef>
+          <a:effectRef idx="1">
+            <a:schemeClr val="accent4"/>
+          </a:effectRef>
+          <a:fontRef idx="minor">
+            <a:schemeClr val="dk1"/>
+          </a:fontRef>
+        </p:style>
+        <p:txBody>
+          <a:bodyPr rtlCol="0" anchor="ctr"/>
+          <a:lstStyle/>
+          <a:p>
+            <a:pPr algn="ctr"/>
+            <a:r>
+              <a:rPr lang="en-US" sz="1050" dirty="0" smtClean="0">
+                <a:solidFill>
+                  <a:srgbClr val="7030A0"/>
+                </a:solidFill>
+              </a:rPr>
+              <a:t>Venue</a:t>
+            </a:r>
+            <a:endParaRPr lang="en-SG" sz="1050" dirty="0">
+              <a:solidFill>
+                <a:srgbClr val="7030A0"/>
+              </a:solidFill>
+            </a:endParaRPr>
+          </a:p>
+        </p:txBody>
+      </p:sp>
+      <p:sp>
+        <p:nvSpPr>
+          <p:cNvPr id="94" name="Rectangle 8">
+            <a:extLst>
+              <a:ext uri="{FF2B5EF4-FFF2-40B4-BE49-F238E27FC236}">
+                <a16:creationId xmlns:a16="http://schemas.microsoft.com/office/drawing/2014/main" xmlns="" id="{3E28DE11-038B-4078-A00D-D599C814C997}"/>
+              </a:ext>
+            </a:extLst>
+          </p:cNvPr>
+          <p:cNvSpPr/>
+          <p:nvPr/>
+        </p:nvSpPr>
+        <p:spPr>
+          <a:xfrm>
+            <a:off x="8022919" y="5928781"/>
+            <a:ext cx="893949" cy="285783"/>
+          </a:xfrm>
+          <a:prstGeom prst="rect">
+            <a:avLst/>
+          </a:prstGeom>
+          <a:ln w="19050">
+            <a:solidFill>
+              <a:srgbClr val="7030A0"/>
+            </a:solidFill>
+          </a:ln>
+          <a:effectLst/>
+        </p:spPr>
+        <p:style>
+          <a:lnRef idx="1">
+            <a:schemeClr val="accent4"/>
+          </a:lnRef>
+          <a:fillRef idx="2">
+            <a:schemeClr val="accent4"/>
+          </a:fillRef>
+          <a:effectRef idx="1">
+            <a:schemeClr val="accent4"/>
+          </a:effectRef>
+          <a:fontRef idx="minor">
+            <a:schemeClr val="dk1"/>
+          </a:fontRef>
+        </p:style>
+        <p:txBody>
+          <a:bodyPr rtlCol="0" anchor="ctr"/>
+          <a:lstStyle/>
+          <a:p>
+            <a:pPr algn="ctr"/>
+            <a:r>
+              <a:rPr lang="en-US" sz="1050" dirty="0" smtClean="0">
+                <a:solidFill>
+                  <a:srgbClr val="7030A0"/>
+                </a:solidFill>
+              </a:rPr>
+              <a:t>Start Time</a:t>
+            </a:r>
+            <a:endParaRPr lang="en-SG" sz="1050" dirty="0">
+              <a:solidFill>
+                <a:srgbClr val="7030A0"/>
+              </a:solidFill>
+            </a:endParaRPr>
+          </a:p>
+        </p:txBody>
+      </p:sp>
+      <p:sp>
+        <p:nvSpPr>
+          <p:cNvPr id="95" name="Rectangle 8">
+            <a:extLst>
+              <a:ext uri="{FF2B5EF4-FFF2-40B4-BE49-F238E27FC236}">
+                <a16:creationId xmlns:a16="http://schemas.microsoft.com/office/drawing/2014/main" xmlns="" id="{3E28DE11-038B-4078-A00D-D599C814C997}"/>
+              </a:ext>
+            </a:extLst>
+          </p:cNvPr>
+          <p:cNvSpPr/>
+          <p:nvPr/>
+        </p:nvSpPr>
+        <p:spPr>
+          <a:xfrm>
+            <a:off x="8007699" y="6283512"/>
+            <a:ext cx="893949" cy="285783"/>
+          </a:xfrm>
+          <a:prstGeom prst="rect">
+            <a:avLst/>
+          </a:prstGeom>
+          <a:ln w="19050">
+            <a:solidFill>
+              <a:srgbClr val="7030A0"/>
+            </a:solidFill>
+          </a:ln>
+          <a:effectLst/>
+        </p:spPr>
+        <p:style>
+          <a:lnRef idx="1">
+            <a:schemeClr val="accent4"/>
+          </a:lnRef>
+          <a:fillRef idx="2">
+            <a:schemeClr val="accent4"/>
+          </a:fillRef>
+          <a:effectRef idx="1">
+            <a:schemeClr val="accent4"/>
+          </a:effectRef>
+          <a:fontRef idx="minor">
+            <a:schemeClr val="dk1"/>
+          </a:fontRef>
+        </p:style>
+        <p:txBody>
+          <a:bodyPr rtlCol="0" anchor="ctr"/>
+          <a:lstStyle/>
+          <a:p>
+            <a:pPr algn="ctr"/>
+            <a:r>
+              <a:rPr lang="en-US" sz="1050" dirty="0" smtClean="0">
+                <a:solidFill>
+                  <a:srgbClr val="7030A0"/>
+                </a:solidFill>
+              </a:rPr>
+              <a:t>End Time</a:t>
+            </a:r>
+            <a:endParaRPr lang="en-SG" sz="1050" dirty="0">
+              <a:solidFill>
+                <a:srgbClr val="7030A0"/>
+              </a:solidFill>
+            </a:endParaRPr>
+          </a:p>
+        </p:txBody>
+      </p:sp>
+      <p:cxnSp>
+        <p:nvCxnSpPr>
+          <p:cNvPr id="96" name="Straight Arrow Connector 95"/>
+          <p:cNvCxnSpPr>
+            <a:stCxn id="88" idx="3"/>
+            <a:endCxn id="93" idx="1"/>
+          </p:cNvCxnSpPr>
+          <p:nvPr/>
+        </p:nvCxnSpPr>
+        <p:spPr>
+          <a:xfrm>
+            <a:off x="7715749" y="5729322"/>
+            <a:ext cx="289706" cy="0"/>
+          </a:xfrm>
+          <a:prstGeom prst="straightConnector1">
+            <a:avLst/>
+          </a:prstGeom>
+          <a:ln w="19050">
+            <a:solidFill>
+              <a:srgbClr val="7030A0"/>
+            </a:solidFill>
+            <a:headEnd type="none" w="med" len="med"/>
+            <a:tailEnd type="arrow" w="med" len="med"/>
+          </a:ln>
+          <a:effectLst/>
+        </p:spPr>
+        <p:style>
+          <a:lnRef idx="1">
+            <a:schemeClr val="accent2"/>
+          </a:lnRef>
+          <a:fillRef idx="2">
+            <a:schemeClr val="accent2"/>
+          </a:fillRef>
+          <a:effectRef idx="1">
+            <a:schemeClr val="accent2"/>
+          </a:effectRef>
+          <a:fontRef idx="minor">
+            <a:schemeClr val="dk1"/>
+          </a:fontRef>
+        </p:style>
+      </p:cxnSp>
+      <p:cxnSp>
+        <p:nvCxnSpPr>
+          <p:cNvPr id="108" name="Straight Arrow Connector 107"/>
+          <p:cNvCxnSpPr/>
+          <p:nvPr/>
+        </p:nvCxnSpPr>
+        <p:spPr>
+          <a:xfrm>
+            <a:off x="7798637" y="6071672"/>
+            <a:ext cx="224282" cy="0"/>
+          </a:xfrm>
+          <a:prstGeom prst="straightConnector1">
+            <a:avLst/>
+          </a:prstGeom>
+          <a:ln w="19050">
+            <a:solidFill>
+              <a:srgbClr val="7030A0"/>
+            </a:solidFill>
+            <a:headEnd type="none" w="med" len="med"/>
+            <a:tailEnd type="arrow" w="med" len="med"/>
+          </a:ln>
+          <a:effectLst/>
+        </p:spPr>
+        <p:style>
+          <a:lnRef idx="1">
+            <a:schemeClr val="accent2"/>
+          </a:lnRef>
+          <a:fillRef idx="2">
+            <a:schemeClr val="accent2"/>
+          </a:fillRef>
+          <a:effectRef idx="1">
+            <a:schemeClr val="accent2"/>
+          </a:effectRef>
+          <a:fontRef idx="minor">
+            <a:schemeClr val="dk1"/>
+          </a:fontRef>
+        </p:style>
+      </p:cxnSp>
+      <p:cxnSp>
+        <p:nvCxnSpPr>
+          <p:cNvPr id="109" name="Straight Arrow Connector 108"/>
+          <p:cNvCxnSpPr/>
+          <p:nvPr/>
+        </p:nvCxnSpPr>
+        <p:spPr>
+          <a:xfrm>
+            <a:off x="7781173" y="6426403"/>
+            <a:ext cx="224282" cy="0"/>
+          </a:xfrm>
+          <a:prstGeom prst="straightConnector1">
+            <a:avLst/>
+          </a:prstGeom>
+          <a:ln w="19050">
+            <a:solidFill>
+              <a:srgbClr val="7030A0"/>
+            </a:solidFill>
+            <a:headEnd type="none" w="med" len="med"/>
+            <a:tailEnd type="arrow" w="med" len="med"/>
+          </a:ln>
+          <a:effectLst/>
+        </p:spPr>
+        <p:style>
+          <a:lnRef idx="1">
+            <a:schemeClr val="accent2"/>
+          </a:lnRef>
+          <a:fillRef idx="2">
+            <a:schemeClr val="accent2"/>
+          </a:fillRef>
+          <a:effectRef idx="1">
+            <a:schemeClr val="accent2"/>
+          </a:effectRef>
+          <a:fontRef idx="minor">
+            <a:schemeClr val="dk1"/>
+          </a:fontRef>
+        </p:style>
+      </p:cxnSp>
+      <p:cxnSp>
+        <p:nvCxnSpPr>
+          <p:cNvPr id="101" name="Straight Connector 100"/>
+          <p:cNvCxnSpPr/>
+          <p:nvPr/>
+        </p:nvCxnSpPr>
+        <p:spPr>
+          <a:xfrm>
+            <a:off x="7781173" y="5729321"/>
+            <a:ext cx="0" cy="697082"/>
+          </a:xfrm>
+          <a:prstGeom prst="line">
+            <a:avLst/>
+          </a:prstGeom>
+          <a:effectLst/>
+        </p:spPr>
+        <p:style>
+          <a:lnRef idx="2">
+            <a:schemeClr val="accent4"/>
+          </a:lnRef>
+          <a:fillRef idx="0">
+            <a:schemeClr val="accent4"/>
+          </a:fillRef>
+          <a:effectRef idx="1">
+            <a:schemeClr val="accent4"/>
+          </a:effectRef>
+          <a:fontRef idx="minor">
+            <a:schemeClr val="tx1"/>
           </a:fontRef>
         </p:style>
       </p:cxnSp>
@@ -6094,6 +6878,13 @@
   <p:clrMapOvr>
     <a:masterClrMapping/>
   </p:clrMapOvr>
+  <p:timing>
+    <p:tnLst>
+      <p:par>
+        <p:cTn id="1" dur="indefinite" restart="never" nodeType="tmRoot"/>
+      </p:par>
+    </p:tnLst>
+  </p:timing>
 </p:sld>
 </file>
 

</xml_diff>